<commit_message>
Updated the figure about the description of flash flood reports. THe figure has also been updated in the manuscript.
</commit_message>
<xml_diff>
--- a/Manuscript/Figures/02_Data_Flash_Flood_Reports.pptx
+++ b/Manuscript/Figures/02_Data_Flash_Flood_Reports.pptx
@@ -115,7 +115,7 @@
 <file path=ppt/revisionInfo.xml><?xml version="1.0" encoding="utf-8"?>
 <p1510:revInfo xmlns:a="http://schemas.openxmlformats.org/drawingml/2006/main" xmlns:r="http://schemas.openxmlformats.org/officeDocument/2006/relationships" xmlns:p1510="http://schemas.microsoft.com/office/powerpoint/2015/10/main">
   <p1510:revLst>
-    <p1510:client id="{1D6CBF78-2251-4D85-B3DB-E7425FCA0324}" v="26" dt="2024-06-25T15:09:21.735"/>
+    <p1510:client id="{1D6CBF78-2251-4D85-B3DB-E7425FCA0324}" v="31" dt="2024-06-29T23:30:48.788"/>
   </p1510:revLst>
 </p1510:revInfo>
 </file>
@@ -125,12 +125,12 @@
   <pc:docChgLst>
     <pc:chgData name="Fatima Pillosu" userId="a6295d4dc9e22643" providerId="LiveId" clId="{1D6CBF78-2251-4D85-B3DB-E7425FCA0324}"/>
     <pc:docChg chg="undo custSel modSld modMainMaster">
-      <pc:chgData name="Fatima Pillosu" userId="a6295d4dc9e22643" providerId="LiveId" clId="{1D6CBF78-2251-4D85-B3DB-E7425FCA0324}" dt="2024-06-25T15:10:00.973" v="2149" actId="14100"/>
+      <pc:chgData name="Fatima Pillosu" userId="a6295d4dc9e22643" providerId="LiveId" clId="{1D6CBF78-2251-4D85-B3DB-E7425FCA0324}" dt="2024-06-29T23:31:54.271" v="2304" actId="14100"/>
       <pc:docMkLst>
         <pc:docMk/>
       </pc:docMkLst>
       <pc:sldChg chg="addSp delSp modSp mod">
-        <pc:chgData name="Fatima Pillosu" userId="a6295d4dc9e22643" providerId="LiveId" clId="{1D6CBF78-2251-4D85-B3DB-E7425FCA0324}" dt="2024-06-25T15:10:00.973" v="2149" actId="14100"/>
+        <pc:chgData name="Fatima Pillosu" userId="a6295d4dc9e22643" providerId="LiveId" clId="{1D6CBF78-2251-4D85-B3DB-E7425FCA0324}" dt="2024-06-29T23:31:54.271" v="2304" actId="14100"/>
         <pc:sldMkLst>
           <pc:docMk/>
           <pc:sldMk cId="43451586" sldId="256"/>
@@ -159,6 +159,14 @@
             <ac:spMk id="4" creationId="{2AFA75F4-9320-83AC-F418-AE771A4C791F}"/>
           </ac:spMkLst>
         </pc:spChg>
+        <pc:spChg chg="add mod">
+          <ac:chgData name="Fatima Pillosu" userId="a6295d4dc9e22643" providerId="LiveId" clId="{1D6CBF78-2251-4D85-B3DB-E7425FCA0324}" dt="2024-06-29T23:06:41.224" v="2161" actId="1582"/>
+          <ac:spMkLst>
+            <pc:docMk/>
+            <pc:sldMk cId="43451586" sldId="256"/>
+            <ac:spMk id="4" creationId="{40D2BF79-CA13-92D1-FF7D-487B73D96841}"/>
+          </ac:spMkLst>
+        </pc:spChg>
         <pc:spChg chg="add del mod">
           <ac:chgData name="Fatima Pillosu" userId="a6295d4dc9e22643" providerId="LiveId" clId="{1D6CBF78-2251-4D85-B3DB-E7425FCA0324}" dt="2024-06-25T11:15:46.465" v="159" actId="21"/>
           <ac:spMkLst>
@@ -4592,11 +4600,179 @@
           </ac:spMkLst>
         </pc:spChg>
         <pc:spChg chg="add mod">
+          <ac:chgData name="Fatima Pillosu" userId="a6295d4dc9e22643" providerId="LiveId" clId="{1D6CBF78-2251-4D85-B3DB-E7425FCA0324}" dt="2024-06-29T23:23:21.971" v="2284" actId="1038"/>
+          <ac:spMkLst>
+            <pc:docMk/>
+            <pc:sldMk cId="43451586" sldId="256"/>
+            <ac:spMk id="697" creationId="{7C17573C-C799-5123-16B2-C86801983E31}"/>
+          </ac:spMkLst>
+        </pc:spChg>
+        <pc:spChg chg="add mod">
+          <ac:chgData name="Fatima Pillosu" userId="a6295d4dc9e22643" providerId="LiveId" clId="{1D6CBF78-2251-4D85-B3DB-E7425FCA0324}" dt="2024-06-29T23:23:21.971" v="2284" actId="1038"/>
+          <ac:spMkLst>
+            <pc:docMk/>
+            <pc:sldMk cId="43451586" sldId="256"/>
+            <ac:spMk id="698" creationId="{9CCE77C0-E23B-B55F-11DB-74B04A4E9816}"/>
+          </ac:spMkLst>
+        </pc:spChg>
+        <pc:spChg chg="add mod">
+          <ac:chgData name="Fatima Pillosu" userId="a6295d4dc9e22643" providerId="LiveId" clId="{1D6CBF78-2251-4D85-B3DB-E7425FCA0324}" dt="2024-06-29T23:23:21.971" v="2284" actId="1038"/>
+          <ac:spMkLst>
+            <pc:docMk/>
+            <pc:sldMk cId="43451586" sldId="256"/>
+            <ac:spMk id="699" creationId="{88008655-BD2F-CDED-7A90-0047337021C1}"/>
+          </ac:spMkLst>
+        </pc:spChg>
+        <pc:spChg chg="add mod">
+          <ac:chgData name="Fatima Pillosu" userId="a6295d4dc9e22643" providerId="LiveId" clId="{1D6CBF78-2251-4D85-B3DB-E7425FCA0324}" dt="2024-06-29T23:23:21.971" v="2284" actId="1038"/>
+          <ac:spMkLst>
+            <pc:docMk/>
+            <pc:sldMk cId="43451586" sldId="256"/>
+            <ac:spMk id="700" creationId="{C124DFF1-487D-5E06-130C-A7A162DA5910}"/>
+          </ac:spMkLst>
+        </pc:spChg>
+        <pc:spChg chg="add mod">
+          <ac:chgData name="Fatima Pillosu" userId="a6295d4dc9e22643" providerId="LiveId" clId="{1D6CBF78-2251-4D85-B3DB-E7425FCA0324}" dt="2024-06-29T23:23:21.971" v="2284" actId="1038"/>
+          <ac:spMkLst>
+            <pc:docMk/>
+            <pc:sldMk cId="43451586" sldId="256"/>
+            <ac:spMk id="701" creationId="{789339E5-7A72-7FB2-0C79-FD1044F52974}"/>
+          </ac:spMkLst>
+        </pc:spChg>
+        <pc:spChg chg="add mod">
+          <ac:chgData name="Fatima Pillosu" userId="a6295d4dc9e22643" providerId="LiveId" clId="{1D6CBF78-2251-4D85-B3DB-E7425FCA0324}" dt="2024-06-29T23:23:21.971" v="2284" actId="1038"/>
+          <ac:spMkLst>
+            <pc:docMk/>
+            <pc:sldMk cId="43451586" sldId="256"/>
+            <ac:spMk id="702" creationId="{A8FF8CEE-E9A6-F65C-F012-68EB740196A4}"/>
+          </ac:spMkLst>
+        </pc:spChg>
+        <pc:spChg chg="add mod">
+          <ac:chgData name="Fatima Pillosu" userId="a6295d4dc9e22643" providerId="LiveId" clId="{1D6CBF78-2251-4D85-B3DB-E7425FCA0324}" dt="2024-06-29T23:23:04.017" v="2279" actId="554"/>
+          <ac:spMkLst>
+            <pc:docMk/>
+            <pc:sldMk cId="43451586" sldId="256"/>
+            <ac:spMk id="703" creationId="{55FEC7FE-7728-A7DE-98B3-DEB97495E088}"/>
+          </ac:spMkLst>
+        </pc:spChg>
+        <pc:spChg chg="add mod">
+          <ac:chgData name="Fatima Pillosu" userId="a6295d4dc9e22643" providerId="LiveId" clId="{1D6CBF78-2251-4D85-B3DB-E7425FCA0324}" dt="2024-06-29T23:23:04.017" v="2279" actId="554"/>
+          <ac:spMkLst>
+            <pc:docMk/>
+            <pc:sldMk cId="43451586" sldId="256"/>
+            <ac:spMk id="704" creationId="{E995B3E1-80A4-5C7B-D7E1-837D27948AF8}"/>
+          </ac:spMkLst>
+        </pc:spChg>
+        <pc:spChg chg="add mod">
+          <ac:chgData name="Fatima Pillosu" userId="a6295d4dc9e22643" providerId="LiveId" clId="{1D6CBF78-2251-4D85-B3DB-E7425FCA0324}" dt="2024-06-29T23:22:22.804" v="2265" actId="555"/>
+          <ac:spMkLst>
+            <pc:docMk/>
+            <pc:sldMk cId="43451586" sldId="256"/>
+            <ac:spMk id="705" creationId="{7874D21D-7052-3C6D-6B41-A681DC9AB412}"/>
+          </ac:spMkLst>
+        </pc:spChg>
+        <pc:spChg chg="add mod">
+          <ac:chgData name="Fatima Pillosu" userId="a6295d4dc9e22643" providerId="LiveId" clId="{1D6CBF78-2251-4D85-B3DB-E7425FCA0324}" dt="2024-06-29T23:22:22.804" v="2265" actId="555"/>
+          <ac:spMkLst>
+            <pc:docMk/>
+            <pc:sldMk cId="43451586" sldId="256"/>
+            <ac:spMk id="706" creationId="{33EF2215-1F57-37BF-8335-0D60597BE644}"/>
+          </ac:spMkLst>
+        </pc:spChg>
+        <pc:spChg chg="add mod">
+          <ac:chgData name="Fatima Pillosu" userId="a6295d4dc9e22643" providerId="LiveId" clId="{1D6CBF78-2251-4D85-B3DB-E7425FCA0324}" dt="2024-06-29T23:22:22.804" v="2265" actId="555"/>
+          <ac:spMkLst>
+            <pc:docMk/>
+            <pc:sldMk cId="43451586" sldId="256"/>
+            <ac:spMk id="707" creationId="{92861C3B-9FE7-FBB4-1D43-2598BFF98C02}"/>
+          </ac:spMkLst>
+        </pc:spChg>
+        <pc:spChg chg="add mod">
+          <ac:chgData name="Fatima Pillosu" userId="a6295d4dc9e22643" providerId="LiveId" clId="{1D6CBF78-2251-4D85-B3DB-E7425FCA0324}" dt="2024-06-29T23:22:22.804" v="2265" actId="555"/>
+          <ac:spMkLst>
+            <pc:docMk/>
+            <pc:sldMk cId="43451586" sldId="256"/>
+            <ac:spMk id="708" creationId="{E8F309B4-CCC7-5743-08CE-623687D6B0F3}"/>
+          </ac:spMkLst>
+        </pc:spChg>
+        <pc:spChg chg="add mod">
+          <ac:chgData name="Fatima Pillosu" userId="a6295d4dc9e22643" providerId="LiveId" clId="{1D6CBF78-2251-4D85-B3DB-E7425FCA0324}" dt="2024-06-29T23:22:22.804" v="2265" actId="555"/>
+          <ac:spMkLst>
+            <pc:docMk/>
+            <pc:sldMk cId="43451586" sldId="256"/>
+            <ac:spMk id="709" creationId="{00BF05C8-6055-5551-6EAC-CFFE56A940F4}"/>
+          </ac:spMkLst>
+        </pc:spChg>
+        <pc:spChg chg="add mod">
+          <ac:chgData name="Fatima Pillosu" userId="a6295d4dc9e22643" providerId="LiveId" clId="{1D6CBF78-2251-4D85-B3DB-E7425FCA0324}" dt="2024-06-29T23:22:22.804" v="2265" actId="555"/>
+          <ac:spMkLst>
+            <pc:docMk/>
+            <pc:sldMk cId="43451586" sldId="256"/>
+            <ac:spMk id="710" creationId="{6F8093E4-3268-9B0A-086E-F7C01EE3B28B}"/>
+          </ac:spMkLst>
+        </pc:spChg>
+        <pc:spChg chg="add mod">
+          <ac:chgData name="Fatima Pillosu" userId="a6295d4dc9e22643" providerId="LiveId" clId="{1D6CBF78-2251-4D85-B3DB-E7425FCA0324}" dt="2024-06-29T23:22:22.804" v="2265" actId="555"/>
+          <ac:spMkLst>
+            <pc:docMk/>
+            <pc:sldMk cId="43451586" sldId="256"/>
+            <ac:spMk id="711" creationId="{D2F50BEC-CC57-BE5E-E8F8-16A93360BF13}"/>
+          </ac:spMkLst>
+        </pc:spChg>
+        <pc:spChg chg="add mod">
+          <ac:chgData name="Fatima Pillosu" userId="a6295d4dc9e22643" providerId="LiveId" clId="{1D6CBF78-2251-4D85-B3DB-E7425FCA0324}" dt="2024-06-29T23:22:22.804" v="2265" actId="555"/>
+          <ac:spMkLst>
+            <pc:docMk/>
+            <pc:sldMk cId="43451586" sldId="256"/>
+            <ac:spMk id="712" creationId="{74CB9AB9-3B04-1C7D-FA67-4650112AD9B1}"/>
+          </ac:spMkLst>
+        </pc:spChg>
+        <pc:spChg chg="add mod">
+          <ac:chgData name="Fatima Pillosu" userId="a6295d4dc9e22643" providerId="LiveId" clId="{1D6CBF78-2251-4D85-B3DB-E7425FCA0324}" dt="2024-06-29T23:22:22.804" v="2265" actId="555"/>
+          <ac:spMkLst>
+            <pc:docMk/>
+            <pc:sldMk cId="43451586" sldId="256"/>
+            <ac:spMk id="713" creationId="{29D45CB1-C312-4F40-49BD-7A8DC56B834A}"/>
+          </ac:spMkLst>
+        </pc:spChg>
+        <pc:spChg chg="add mod">
+          <ac:chgData name="Fatima Pillosu" userId="a6295d4dc9e22643" providerId="LiveId" clId="{1D6CBF78-2251-4D85-B3DB-E7425FCA0324}" dt="2024-06-29T23:22:22.804" v="2265" actId="555"/>
+          <ac:spMkLst>
+            <pc:docMk/>
+            <pc:sldMk cId="43451586" sldId="256"/>
+            <ac:spMk id="714" creationId="{8EB66DCE-6123-F9D2-62DD-6CA3024B5877}"/>
+          </ac:spMkLst>
+        </pc:spChg>
+        <pc:spChg chg="add mod">
+          <ac:chgData name="Fatima Pillosu" userId="a6295d4dc9e22643" providerId="LiveId" clId="{1D6CBF78-2251-4D85-B3DB-E7425FCA0324}" dt="2024-06-29T23:22:22.804" v="2265" actId="555"/>
+          <ac:spMkLst>
+            <pc:docMk/>
+            <pc:sldMk cId="43451586" sldId="256"/>
+            <ac:spMk id="715" creationId="{E20A3ECD-9042-500D-E822-43BB3A838B79}"/>
+          </ac:spMkLst>
+        </pc:spChg>
+        <pc:spChg chg="add mod">
+          <ac:chgData name="Fatima Pillosu" userId="a6295d4dc9e22643" providerId="LiveId" clId="{1D6CBF78-2251-4D85-B3DB-E7425FCA0324}" dt="2024-06-29T23:25:24.345" v="2286" actId="207"/>
+          <ac:spMkLst>
+            <pc:docMk/>
+            <pc:sldMk cId="43451586" sldId="256"/>
+            <ac:spMk id="716" creationId="{8AB7B439-9D18-FD5C-5754-19FD66FE0958}"/>
+          </ac:spMkLst>
+        </pc:spChg>
+        <pc:spChg chg="add mod">
+          <ac:chgData name="Fatima Pillosu" userId="a6295d4dc9e22643" providerId="LiveId" clId="{1D6CBF78-2251-4D85-B3DB-E7425FCA0324}" dt="2024-06-29T23:25:17.559" v="2285" actId="207"/>
+          <ac:spMkLst>
+            <pc:docMk/>
+            <pc:sldMk cId="43451586" sldId="256"/>
+            <ac:spMk id="717" creationId="{9448AB5A-5518-ECF9-A66D-05D7D471FC17}"/>
+          </ac:spMkLst>
+        </pc:spChg>
+        <pc:spChg chg="add mod">
           <ac:chgData name="Fatima Pillosu" userId="a6295d4dc9e22643" providerId="LiveId" clId="{1D6CBF78-2251-4D85-B3DB-E7425FCA0324}" dt="2024-06-25T15:06:27.597" v="2072" actId="1035"/>
           <ac:spMkLst>
             <pc:docMk/>
             <pc:sldMk cId="43451586" sldId="256"/>
-            <ac:spMk id="697" creationId="{7C17573C-C799-5123-16B2-C86801983E31}"/>
+            <ac:spMk id="718" creationId="{DE4AB540-5F74-6029-6341-C9585064B7C0}"/>
           </ac:spMkLst>
         </pc:spChg>
         <pc:spChg chg="add mod">
@@ -4604,7 +4780,7 @@
           <ac:spMkLst>
             <pc:docMk/>
             <pc:sldMk cId="43451586" sldId="256"/>
-            <ac:spMk id="698" creationId="{9CCE77C0-E23B-B55F-11DB-74B04A4E9816}"/>
+            <ac:spMk id="719" creationId="{8A66F6BF-E540-82DD-E4B8-D293D379DCC1}"/>
           </ac:spMkLst>
         </pc:spChg>
         <pc:spChg chg="add mod">
@@ -4612,7 +4788,7 @@
           <ac:spMkLst>
             <pc:docMk/>
             <pc:sldMk cId="43451586" sldId="256"/>
-            <ac:spMk id="699" creationId="{88008655-BD2F-CDED-7A90-0047337021C1}"/>
+            <ac:spMk id="720" creationId="{EC0EE389-4B7D-2688-438E-8136C55DE107}"/>
           </ac:spMkLst>
         </pc:spChg>
         <pc:spChg chg="add mod">
@@ -4620,7 +4796,7 @@
           <ac:spMkLst>
             <pc:docMk/>
             <pc:sldMk cId="43451586" sldId="256"/>
-            <ac:spMk id="700" creationId="{C124DFF1-487D-5E06-130C-A7A162DA5910}"/>
+            <ac:spMk id="721" creationId="{1E73637B-7AE2-657A-AF16-54B34FD20C59}"/>
           </ac:spMkLst>
         </pc:spChg>
         <pc:spChg chg="add mod">
@@ -4628,7 +4804,7 @@
           <ac:spMkLst>
             <pc:docMk/>
             <pc:sldMk cId="43451586" sldId="256"/>
-            <ac:spMk id="701" creationId="{789339E5-7A72-7FB2-0C79-FD1044F52974}"/>
+            <ac:spMk id="722" creationId="{0698E198-8F83-AFA7-54BB-534DC700082B}"/>
           </ac:spMkLst>
         </pc:spChg>
         <pc:spChg chg="add mod">
@@ -4636,7 +4812,7 @@
           <ac:spMkLst>
             <pc:docMk/>
             <pc:sldMk cId="43451586" sldId="256"/>
-            <ac:spMk id="702" creationId="{A8FF8CEE-E9A6-F65C-F012-68EB740196A4}"/>
+            <ac:spMk id="723" creationId="{A58DE3E9-45ED-9AEE-77C3-A2FC7FC7A06D}"/>
           </ac:spMkLst>
         </pc:spChg>
         <pc:spChg chg="add mod">
@@ -4644,7 +4820,7 @@
           <ac:spMkLst>
             <pc:docMk/>
             <pc:sldMk cId="43451586" sldId="256"/>
-            <ac:spMk id="703" creationId="{55FEC7FE-7728-A7DE-98B3-DEB97495E088}"/>
+            <ac:spMk id="724" creationId="{12709BF2-DBDA-59B0-6498-09A95BA5F438}"/>
           </ac:spMkLst>
         </pc:spChg>
         <pc:spChg chg="add mod">
@@ -4652,7 +4828,7 @@
           <ac:spMkLst>
             <pc:docMk/>
             <pc:sldMk cId="43451586" sldId="256"/>
-            <ac:spMk id="704" creationId="{E995B3E1-80A4-5C7B-D7E1-837D27948AF8}"/>
+            <ac:spMk id="725" creationId="{1AB9BCFF-7E74-311F-ECE5-7B7AB6A9F25B}"/>
           </ac:spMkLst>
         </pc:spChg>
         <pc:spChg chg="add mod">
@@ -4660,7 +4836,7 @@
           <ac:spMkLst>
             <pc:docMk/>
             <pc:sldMk cId="43451586" sldId="256"/>
-            <ac:spMk id="705" creationId="{7874D21D-7052-3C6D-6B41-A681DC9AB412}"/>
+            <ac:spMk id="726" creationId="{EDDE338C-3E58-5E1E-1F55-0680BF68D752}"/>
           </ac:spMkLst>
         </pc:spChg>
         <pc:spChg chg="add mod">
@@ -4668,7 +4844,7 @@
           <ac:spMkLst>
             <pc:docMk/>
             <pc:sldMk cId="43451586" sldId="256"/>
-            <ac:spMk id="706" creationId="{33EF2215-1F57-37BF-8335-0D60597BE644}"/>
+            <ac:spMk id="727" creationId="{BDEE40BE-DD74-5499-3156-F47611323189}"/>
           </ac:spMkLst>
         </pc:spChg>
         <pc:spChg chg="add mod">
@@ -4676,7 +4852,7 @@
           <ac:spMkLst>
             <pc:docMk/>
             <pc:sldMk cId="43451586" sldId="256"/>
-            <ac:spMk id="707" creationId="{92861C3B-9FE7-FBB4-1D43-2598BFF98C02}"/>
+            <ac:spMk id="728" creationId="{EC3B262F-F665-BC02-703F-694A8151445A}"/>
           </ac:spMkLst>
         </pc:spChg>
         <pc:spChg chg="add mod">
@@ -4684,7 +4860,7 @@
           <ac:spMkLst>
             <pc:docMk/>
             <pc:sldMk cId="43451586" sldId="256"/>
-            <ac:spMk id="708" creationId="{E8F309B4-CCC7-5743-08CE-623687D6B0F3}"/>
+            <ac:spMk id="729" creationId="{8FA0611F-E58B-BB6A-5A97-1F507C5C7116}"/>
           </ac:spMkLst>
         </pc:spChg>
         <pc:spChg chg="add mod">
@@ -4692,7 +4868,7 @@
           <ac:spMkLst>
             <pc:docMk/>
             <pc:sldMk cId="43451586" sldId="256"/>
-            <ac:spMk id="709" creationId="{00BF05C8-6055-5551-6EAC-CFFE56A940F4}"/>
+            <ac:spMk id="730" creationId="{275AD283-E7A8-B677-24D5-E8773130F871}"/>
           </ac:spMkLst>
         </pc:spChg>
         <pc:spChg chg="add mod">
@@ -4700,7 +4876,7 @@
           <ac:spMkLst>
             <pc:docMk/>
             <pc:sldMk cId="43451586" sldId="256"/>
-            <ac:spMk id="710" creationId="{6F8093E4-3268-9B0A-086E-F7C01EE3B28B}"/>
+            <ac:spMk id="731" creationId="{892F522D-D57B-51D6-49DF-791725269E48}"/>
           </ac:spMkLst>
         </pc:spChg>
         <pc:spChg chg="add mod">
@@ -4708,7 +4884,7 @@
           <ac:spMkLst>
             <pc:docMk/>
             <pc:sldMk cId="43451586" sldId="256"/>
-            <ac:spMk id="711" creationId="{D2F50BEC-CC57-BE5E-E8F8-16A93360BF13}"/>
+            <ac:spMk id="732" creationId="{1F8AE4DD-7FBF-6CAD-A047-8B929DF531D5}"/>
           </ac:spMkLst>
         </pc:spChg>
         <pc:spChg chg="add mod">
@@ -4716,7 +4892,7 @@
           <ac:spMkLst>
             <pc:docMk/>
             <pc:sldMk cId="43451586" sldId="256"/>
-            <ac:spMk id="712" creationId="{74CB9AB9-3B04-1C7D-FA67-4650112AD9B1}"/>
+            <ac:spMk id="733" creationId="{7D6A82D8-1C99-D4E8-A8BE-73E4068CA3C9}"/>
           </ac:spMkLst>
         </pc:spChg>
         <pc:spChg chg="add mod">
@@ -4724,7 +4900,7 @@
           <ac:spMkLst>
             <pc:docMk/>
             <pc:sldMk cId="43451586" sldId="256"/>
-            <ac:spMk id="713" creationId="{29D45CB1-C312-4F40-49BD-7A8DC56B834A}"/>
+            <ac:spMk id="734" creationId="{421711CF-B44C-2382-3130-ED039D6C0CAE}"/>
           </ac:spMkLst>
         </pc:spChg>
         <pc:spChg chg="add mod">
@@ -4732,7 +4908,7 @@
           <ac:spMkLst>
             <pc:docMk/>
             <pc:sldMk cId="43451586" sldId="256"/>
-            <ac:spMk id="714" creationId="{8EB66DCE-6123-F9D2-62DD-6CA3024B5877}"/>
+            <ac:spMk id="735" creationId="{AC8BD3EA-4C38-F224-EC06-FB73E64A1864}"/>
           </ac:spMkLst>
         </pc:spChg>
         <pc:spChg chg="add mod">
@@ -4740,7 +4916,7 @@
           <ac:spMkLst>
             <pc:docMk/>
             <pc:sldMk cId="43451586" sldId="256"/>
-            <ac:spMk id="715" creationId="{E20A3ECD-9042-500D-E822-43BB3A838B79}"/>
+            <ac:spMk id="736" creationId="{FB1316DF-BCEE-4513-237B-A7315FF151AD}"/>
           </ac:spMkLst>
         </pc:spChg>
         <pc:spChg chg="add mod">
@@ -4748,7 +4924,7 @@
           <ac:spMkLst>
             <pc:docMk/>
             <pc:sldMk cId="43451586" sldId="256"/>
-            <ac:spMk id="716" creationId="{8AB7B439-9D18-FD5C-5754-19FD66FE0958}"/>
+            <ac:spMk id="737" creationId="{EC790F7C-A709-1A6D-5E6D-AF9CB877AC0D}"/>
           </ac:spMkLst>
         </pc:spChg>
         <pc:spChg chg="add mod">
@@ -4756,7 +4932,7 @@
           <ac:spMkLst>
             <pc:docMk/>
             <pc:sldMk cId="43451586" sldId="256"/>
-            <ac:spMk id="717" creationId="{9448AB5A-5518-ECF9-A66D-05D7D471FC17}"/>
+            <ac:spMk id="738" creationId="{0A59A298-4E81-D1AB-177C-92C87C354E96}"/>
           </ac:spMkLst>
         </pc:spChg>
         <pc:spChg chg="add mod">
@@ -4764,7 +4940,7 @@
           <ac:spMkLst>
             <pc:docMk/>
             <pc:sldMk cId="43451586" sldId="256"/>
-            <ac:spMk id="718" creationId="{DE4AB540-5F74-6029-6341-C9585064B7C0}"/>
+            <ac:spMk id="739" creationId="{DD438DBE-71D2-C013-8C1D-9FDF4CB039B7}"/>
           </ac:spMkLst>
         </pc:spChg>
         <pc:spChg chg="add mod">
@@ -4772,7 +4948,7 @@
           <ac:spMkLst>
             <pc:docMk/>
             <pc:sldMk cId="43451586" sldId="256"/>
-            <ac:spMk id="719" creationId="{8A66F6BF-E540-82DD-E4B8-D293D379DCC1}"/>
+            <ac:spMk id="740" creationId="{DFD21A9A-D406-7E08-F2BE-F9BD2256DFDC}"/>
           </ac:spMkLst>
         </pc:spChg>
         <pc:spChg chg="add mod">
@@ -4780,7 +4956,7 @@
           <ac:spMkLst>
             <pc:docMk/>
             <pc:sldMk cId="43451586" sldId="256"/>
-            <ac:spMk id="720" creationId="{EC0EE389-4B7D-2688-438E-8136C55DE107}"/>
+            <ac:spMk id="743" creationId="{358D5BA2-AC09-E3BE-5925-4E280BF5392C}"/>
           </ac:spMkLst>
         </pc:spChg>
         <pc:spChg chg="add mod">
@@ -4788,7 +4964,7 @@
           <ac:spMkLst>
             <pc:docMk/>
             <pc:sldMk cId="43451586" sldId="256"/>
-            <ac:spMk id="721" creationId="{1E73637B-7AE2-657A-AF16-54B34FD20C59}"/>
+            <ac:spMk id="745" creationId="{A8CC62F0-F0F5-BB7C-7090-165827B009EA}"/>
           </ac:spMkLst>
         </pc:spChg>
         <pc:spChg chg="add mod">
@@ -4796,7 +4972,7 @@
           <ac:spMkLst>
             <pc:docMk/>
             <pc:sldMk cId="43451586" sldId="256"/>
-            <ac:spMk id="722" creationId="{0698E198-8F83-AFA7-54BB-534DC700082B}"/>
+            <ac:spMk id="746" creationId="{224951B6-201A-62C3-DF30-8BED60E209CB}"/>
           </ac:spMkLst>
         </pc:spChg>
         <pc:spChg chg="add mod">
@@ -4804,7 +4980,7 @@
           <ac:spMkLst>
             <pc:docMk/>
             <pc:sldMk cId="43451586" sldId="256"/>
-            <ac:spMk id="723" creationId="{A58DE3E9-45ED-9AEE-77C3-A2FC7FC7A06D}"/>
+            <ac:spMk id="747" creationId="{D66BC3B6-6FCC-1F9D-8AAF-BC0A8DF55987}"/>
           </ac:spMkLst>
         </pc:spChg>
         <pc:spChg chg="add mod">
@@ -4812,7 +4988,7 @@
           <ac:spMkLst>
             <pc:docMk/>
             <pc:sldMk cId="43451586" sldId="256"/>
-            <ac:spMk id="724" creationId="{12709BF2-DBDA-59B0-6498-09A95BA5F438}"/>
+            <ac:spMk id="748" creationId="{33A1E241-1F83-A87C-4CB6-350B02147144}"/>
           </ac:spMkLst>
         </pc:spChg>
         <pc:spChg chg="add mod">
@@ -4820,7 +4996,7 @@
           <ac:spMkLst>
             <pc:docMk/>
             <pc:sldMk cId="43451586" sldId="256"/>
-            <ac:spMk id="725" creationId="{1AB9BCFF-7E74-311F-ECE5-7B7AB6A9F25B}"/>
+            <ac:spMk id="749" creationId="{7B1D2795-5380-39F2-E4E2-0E9A73718374}"/>
           </ac:spMkLst>
         </pc:spChg>
         <pc:spChg chg="add mod">
@@ -4828,7 +5004,7 @@
           <ac:spMkLst>
             <pc:docMk/>
             <pc:sldMk cId="43451586" sldId="256"/>
-            <ac:spMk id="726" creationId="{EDDE338C-3E58-5E1E-1F55-0680BF68D752}"/>
+            <ac:spMk id="750" creationId="{E0D9EE54-E630-BE33-8FAF-26B753BD5112}"/>
           </ac:spMkLst>
         </pc:spChg>
         <pc:spChg chg="add mod">
@@ -4836,7 +5012,7 @@
           <ac:spMkLst>
             <pc:docMk/>
             <pc:sldMk cId="43451586" sldId="256"/>
-            <ac:spMk id="727" creationId="{BDEE40BE-DD74-5499-3156-F47611323189}"/>
+            <ac:spMk id="751" creationId="{B540D4B0-1565-BB57-E3A6-5A5A72714B5B}"/>
           </ac:spMkLst>
         </pc:spChg>
         <pc:spChg chg="add mod">
@@ -4844,7 +5020,7 @@
           <ac:spMkLst>
             <pc:docMk/>
             <pc:sldMk cId="43451586" sldId="256"/>
-            <ac:spMk id="728" creationId="{EC3B262F-F665-BC02-703F-694A8151445A}"/>
+            <ac:spMk id="752" creationId="{AA2DCEF9-BC9D-C6FF-2E16-187CC480DE36}"/>
           </ac:spMkLst>
         </pc:spChg>
         <pc:spChg chg="add mod">
@@ -4852,7 +5028,7 @@
           <ac:spMkLst>
             <pc:docMk/>
             <pc:sldMk cId="43451586" sldId="256"/>
-            <ac:spMk id="729" creationId="{8FA0611F-E58B-BB6A-5A97-1F507C5C7116}"/>
+            <ac:spMk id="753" creationId="{A9DDECDC-ADCB-7C8B-E024-F0847A1C7E3A}"/>
           </ac:spMkLst>
         </pc:spChg>
         <pc:spChg chg="add mod">
@@ -4860,7 +5036,7 @@
           <ac:spMkLst>
             <pc:docMk/>
             <pc:sldMk cId="43451586" sldId="256"/>
-            <ac:spMk id="730" creationId="{275AD283-E7A8-B677-24D5-E8773130F871}"/>
+            <ac:spMk id="754" creationId="{1141BE46-0E31-8815-50C9-64F169A8767A}"/>
           </ac:spMkLst>
         </pc:spChg>
         <pc:spChg chg="add mod">
@@ -4868,7 +5044,7 @@
           <ac:spMkLst>
             <pc:docMk/>
             <pc:sldMk cId="43451586" sldId="256"/>
-            <ac:spMk id="731" creationId="{892F522D-D57B-51D6-49DF-791725269E48}"/>
+            <ac:spMk id="755" creationId="{563E7CC2-A585-B58A-1246-799EB33139CF}"/>
           </ac:spMkLst>
         </pc:spChg>
         <pc:spChg chg="add mod">
@@ -4876,7 +5052,7 @@
           <ac:spMkLst>
             <pc:docMk/>
             <pc:sldMk cId="43451586" sldId="256"/>
-            <ac:spMk id="732" creationId="{1F8AE4DD-7FBF-6CAD-A047-8B929DF531D5}"/>
+            <ac:spMk id="756" creationId="{42DDBF0F-90A6-4F14-C1BE-0D4853D453F6}"/>
           </ac:spMkLst>
         </pc:spChg>
         <pc:spChg chg="add mod">
@@ -4884,7 +5060,7 @@
           <ac:spMkLst>
             <pc:docMk/>
             <pc:sldMk cId="43451586" sldId="256"/>
-            <ac:spMk id="733" creationId="{7D6A82D8-1C99-D4E8-A8BE-73E4068CA3C9}"/>
+            <ac:spMk id="757" creationId="{44F954D5-AAE7-D694-C5EA-9688337428C5}"/>
           </ac:spMkLst>
         </pc:spChg>
         <pc:spChg chg="add mod">
@@ -4892,7 +5068,7 @@
           <ac:spMkLst>
             <pc:docMk/>
             <pc:sldMk cId="43451586" sldId="256"/>
-            <ac:spMk id="734" creationId="{421711CF-B44C-2382-3130-ED039D6C0CAE}"/>
+            <ac:spMk id="758" creationId="{3E15F64D-F4D9-5B58-02C9-393E992A9346}"/>
           </ac:spMkLst>
         </pc:spChg>
         <pc:spChg chg="add mod">
@@ -4900,7 +5076,7 @@
           <ac:spMkLst>
             <pc:docMk/>
             <pc:sldMk cId="43451586" sldId="256"/>
-            <ac:spMk id="735" creationId="{AC8BD3EA-4C38-F224-EC06-FB73E64A1864}"/>
+            <ac:spMk id="759" creationId="{5A9E7597-0FBD-8C84-A3DA-9DD9719216B6}"/>
           </ac:spMkLst>
         </pc:spChg>
         <pc:spChg chg="add mod">
@@ -4908,7 +5084,7 @@
           <ac:spMkLst>
             <pc:docMk/>
             <pc:sldMk cId="43451586" sldId="256"/>
-            <ac:spMk id="736" creationId="{FB1316DF-BCEE-4513-237B-A7315FF151AD}"/>
+            <ac:spMk id="760" creationId="{5FCD5A6A-6CE2-E2A2-3D18-E56B4ABD0C98}"/>
           </ac:spMkLst>
         </pc:spChg>
         <pc:spChg chg="add mod">
@@ -4916,7 +5092,7 @@
           <ac:spMkLst>
             <pc:docMk/>
             <pc:sldMk cId="43451586" sldId="256"/>
-            <ac:spMk id="737" creationId="{EC790F7C-A709-1A6D-5E6D-AF9CB877AC0D}"/>
+            <ac:spMk id="761" creationId="{E6D6809F-1659-33C1-72A2-D47C851E8EC7}"/>
           </ac:spMkLst>
         </pc:spChg>
         <pc:spChg chg="add mod">
@@ -4924,7 +5100,7 @@
           <ac:spMkLst>
             <pc:docMk/>
             <pc:sldMk cId="43451586" sldId="256"/>
-            <ac:spMk id="738" creationId="{0A59A298-4E81-D1AB-177C-92C87C354E96}"/>
+            <ac:spMk id="762" creationId="{B61C2670-65F0-04A8-84CE-D918EACDF7DE}"/>
           </ac:spMkLst>
         </pc:spChg>
         <pc:spChg chg="add mod">
@@ -4932,7 +5108,7 @@
           <ac:spMkLst>
             <pc:docMk/>
             <pc:sldMk cId="43451586" sldId="256"/>
-            <ac:spMk id="739" creationId="{DD438DBE-71D2-C013-8C1D-9FDF4CB039B7}"/>
+            <ac:spMk id="763" creationId="{BEA09D59-5A26-F783-6FDE-9C25DC976B89}"/>
           </ac:spMkLst>
         </pc:spChg>
         <pc:spChg chg="add mod">
@@ -4940,7 +5116,7 @@
           <ac:spMkLst>
             <pc:docMk/>
             <pc:sldMk cId="43451586" sldId="256"/>
-            <ac:spMk id="740" creationId="{DFD21A9A-D406-7E08-F2BE-F9BD2256DFDC}"/>
+            <ac:spMk id="764" creationId="{ED070E8E-B856-5C68-40DE-2F1F8E95A8EC}"/>
           </ac:spMkLst>
         </pc:spChg>
         <pc:spChg chg="add mod">
@@ -4948,7 +5124,7 @@
           <ac:spMkLst>
             <pc:docMk/>
             <pc:sldMk cId="43451586" sldId="256"/>
-            <ac:spMk id="743" creationId="{358D5BA2-AC09-E3BE-5925-4E280BF5392C}"/>
+            <ac:spMk id="765" creationId="{EBE83CCF-4885-72C9-6A97-96E948D951F8}"/>
           </ac:spMkLst>
         </pc:spChg>
         <pc:spChg chg="add mod">
@@ -4956,7 +5132,7 @@
           <ac:spMkLst>
             <pc:docMk/>
             <pc:sldMk cId="43451586" sldId="256"/>
-            <ac:spMk id="745" creationId="{A8CC62F0-F0F5-BB7C-7090-165827B009EA}"/>
+            <ac:spMk id="766" creationId="{20B28656-5DB3-65BD-36F4-DBBA967920E5}"/>
           </ac:spMkLst>
         </pc:spChg>
         <pc:spChg chg="add mod">
@@ -4964,7 +5140,7 @@
           <ac:spMkLst>
             <pc:docMk/>
             <pc:sldMk cId="43451586" sldId="256"/>
-            <ac:spMk id="746" creationId="{224951B6-201A-62C3-DF30-8BED60E209CB}"/>
+            <ac:spMk id="767" creationId="{D8641BE1-6CD9-7E4D-E2CD-2B1456EA844A}"/>
           </ac:spMkLst>
         </pc:spChg>
         <pc:spChg chg="add mod">
@@ -4972,7 +5148,7 @@
           <ac:spMkLst>
             <pc:docMk/>
             <pc:sldMk cId="43451586" sldId="256"/>
-            <ac:spMk id="747" creationId="{D66BC3B6-6FCC-1F9D-8AAF-BC0A8DF55987}"/>
+            <ac:spMk id="768" creationId="{7610650F-D3E4-DFA1-716F-0621CD07F223}"/>
           </ac:spMkLst>
         </pc:spChg>
         <pc:spChg chg="add mod">
@@ -4980,7 +5156,7 @@
           <ac:spMkLst>
             <pc:docMk/>
             <pc:sldMk cId="43451586" sldId="256"/>
-            <ac:spMk id="748" creationId="{33A1E241-1F83-A87C-4CB6-350B02147144}"/>
+            <ac:spMk id="769" creationId="{0D6BD531-3A87-3742-5A40-070BC09FFDBF}"/>
           </ac:spMkLst>
         </pc:spChg>
         <pc:spChg chg="add mod">
@@ -4988,7 +5164,7 @@
           <ac:spMkLst>
             <pc:docMk/>
             <pc:sldMk cId="43451586" sldId="256"/>
-            <ac:spMk id="749" creationId="{7B1D2795-5380-39F2-E4E2-0E9A73718374}"/>
+            <ac:spMk id="771" creationId="{39634027-628E-FD64-26AD-6B48398A0DBA}"/>
           </ac:spMkLst>
         </pc:spChg>
         <pc:spChg chg="add mod">
@@ -4996,7 +5172,7 @@
           <ac:spMkLst>
             <pc:docMk/>
             <pc:sldMk cId="43451586" sldId="256"/>
-            <ac:spMk id="750" creationId="{E0D9EE54-E630-BE33-8FAF-26B753BD5112}"/>
+            <ac:spMk id="774" creationId="{4A0C66AA-527E-FBD3-4EA9-2D8C7A8439ED}"/>
           </ac:spMkLst>
         </pc:spChg>
         <pc:spChg chg="add mod">
@@ -5004,7 +5180,7 @@
           <ac:spMkLst>
             <pc:docMk/>
             <pc:sldMk cId="43451586" sldId="256"/>
-            <ac:spMk id="751" creationId="{B540D4B0-1565-BB57-E3A6-5A5A72714B5B}"/>
+            <ac:spMk id="775" creationId="{53786A25-BF5D-DD4A-11A4-24196734E502}"/>
           </ac:spMkLst>
         </pc:spChg>
         <pc:spChg chg="add mod">
@@ -5012,7 +5188,7 @@
           <ac:spMkLst>
             <pc:docMk/>
             <pc:sldMk cId="43451586" sldId="256"/>
-            <ac:spMk id="752" creationId="{AA2DCEF9-BC9D-C6FF-2E16-187CC480DE36}"/>
+            <ac:spMk id="776" creationId="{2A4BE103-7C09-BB50-9A93-95709158774D}"/>
           </ac:spMkLst>
         </pc:spChg>
         <pc:spChg chg="add mod">
@@ -5020,7 +5196,7 @@
           <ac:spMkLst>
             <pc:docMk/>
             <pc:sldMk cId="43451586" sldId="256"/>
-            <ac:spMk id="753" creationId="{A9DDECDC-ADCB-7C8B-E024-F0847A1C7E3A}"/>
+            <ac:spMk id="777" creationId="{24BE8C28-F441-5648-C02C-0B394AAC9267}"/>
           </ac:spMkLst>
         </pc:spChg>
         <pc:spChg chg="add mod">
@@ -5028,7 +5204,7 @@
           <ac:spMkLst>
             <pc:docMk/>
             <pc:sldMk cId="43451586" sldId="256"/>
-            <ac:spMk id="754" creationId="{1141BE46-0E31-8815-50C9-64F169A8767A}"/>
+            <ac:spMk id="778" creationId="{CDD9B423-DBD5-45AC-045E-CD2DE2C251E9}"/>
           </ac:spMkLst>
         </pc:spChg>
         <pc:spChg chg="add mod">
@@ -5036,7 +5212,7 @@
           <ac:spMkLst>
             <pc:docMk/>
             <pc:sldMk cId="43451586" sldId="256"/>
-            <ac:spMk id="755" creationId="{563E7CC2-A585-B58A-1246-799EB33139CF}"/>
+            <ac:spMk id="779" creationId="{2BDFC988-6BEE-8F2B-314B-A7C9CC7AE102}"/>
           </ac:spMkLst>
         </pc:spChg>
         <pc:spChg chg="add mod">
@@ -5044,7 +5220,7 @@
           <ac:spMkLst>
             <pc:docMk/>
             <pc:sldMk cId="43451586" sldId="256"/>
-            <ac:spMk id="756" creationId="{42DDBF0F-90A6-4F14-C1BE-0D4853D453F6}"/>
+            <ac:spMk id="780" creationId="{3F6A373D-1512-4A70-DD87-F376AB69B750}"/>
           </ac:spMkLst>
         </pc:spChg>
         <pc:spChg chg="add mod">
@@ -5052,7 +5228,7 @@
           <ac:spMkLst>
             <pc:docMk/>
             <pc:sldMk cId="43451586" sldId="256"/>
-            <ac:spMk id="757" creationId="{44F954D5-AAE7-D694-C5EA-9688337428C5}"/>
+            <ac:spMk id="781" creationId="{E6C3F952-0914-4C3D-C859-53A44087F7EB}"/>
           </ac:spMkLst>
         </pc:spChg>
         <pc:spChg chg="add mod">
@@ -5060,7 +5236,7 @@
           <ac:spMkLst>
             <pc:docMk/>
             <pc:sldMk cId="43451586" sldId="256"/>
-            <ac:spMk id="758" creationId="{3E15F64D-F4D9-5B58-02C9-393E992A9346}"/>
+            <ac:spMk id="782" creationId="{C8AAC689-DD18-D864-5D53-7A644AF75EB7}"/>
           </ac:spMkLst>
         </pc:spChg>
         <pc:spChg chg="add mod">
@@ -5068,7 +5244,7 @@
           <ac:spMkLst>
             <pc:docMk/>
             <pc:sldMk cId="43451586" sldId="256"/>
-            <ac:spMk id="759" creationId="{5A9E7597-0FBD-8C84-A3DA-9DD9719216B6}"/>
+            <ac:spMk id="783" creationId="{F1B9B417-B98D-CA70-0A56-420E7BB44407}"/>
           </ac:spMkLst>
         </pc:spChg>
         <pc:spChg chg="add mod">
@@ -5076,7 +5252,7 @@
           <ac:spMkLst>
             <pc:docMk/>
             <pc:sldMk cId="43451586" sldId="256"/>
-            <ac:spMk id="760" creationId="{5FCD5A6A-6CE2-E2A2-3D18-E56B4ABD0C98}"/>
+            <ac:spMk id="784" creationId="{2CD2DA22-BA9E-6BEE-866F-E1237B2A0200}"/>
           </ac:spMkLst>
         </pc:spChg>
         <pc:spChg chg="add mod">
@@ -5084,7 +5260,7 @@
           <ac:spMkLst>
             <pc:docMk/>
             <pc:sldMk cId="43451586" sldId="256"/>
-            <ac:spMk id="761" creationId="{E6D6809F-1659-33C1-72A2-D47C851E8EC7}"/>
+            <ac:spMk id="785" creationId="{6667EEC8-FBF3-7CDA-86FD-FF3037E44F4C}"/>
           </ac:spMkLst>
         </pc:spChg>
         <pc:spChg chg="add mod">
@@ -5092,7 +5268,15 @@
           <ac:spMkLst>
             <pc:docMk/>
             <pc:sldMk cId="43451586" sldId="256"/>
-            <ac:spMk id="762" creationId="{B61C2670-65F0-04A8-84CE-D918EACDF7DE}"/>
+            <ac:spMk id="786" creationId="{D3109596-9E20-E94E-3C6A-9DB517257DA9}"/>
+          </ac:spMkLst>
+        </pc:spChg>
+        <pc:spChg chg="add mod">
+          <ac:chgData name="Fatima Pillosu" userId="a6295d4dc9e22643" providerId="LiveId" clId="{1D6CBF78-2251-4D85-B3DB-E7425FCA0324}" dt="2024-06-25T15:10:00.973" v="2149" actId="14100"/>
+          <ac:spMkLst>
+            <pc:docMk/>
+            <pc:sldMk cId="43451586" sldId="256"/>
+            <ac:spMk id="787" creationId="{0992449B-E2BD-5656-FCBA-66DA5579C5B4}"/>
           </ac:spMkLst>
         </pc:spChg>
         <pc:spChg chg="add mod">
@@ -5100,7 +5284,7 @@
           <ac:spMkLst>
             <pc:docMk/>
             <pc:sldMk cId="43451586" sldId="256"/>
-            <ac:spMk id="763" creationId="{BEA09D59-5A26-F783-6FDE-9C25DC976B89}"/>
+            <ac:spMk id="788" creationId="{FBC7318D-1ADC-03C2-C0AA-599DF73A44A0}"/>
           </ac:spMkLst>
         </pc:spChg>
         <pc:spChg chg="add mod">
@@ -5108,7 +5292,7 @@
           <ac:spMkLst>
             <pc:docMk/>
             <pc:sldMk cId="43451586" sldId="256"/>
-            <ac:spMk id="764" creationId="{ED070E8E-B856-5C68-40DE-2F1F8E95A8EC}"/>
+            <ac:spMk id="789" creationId="{5DAF83FA-08B8-C856-1B3B-B496269AADF0}"/>
           </ac:spMkLst>
         </pc:spChg>
         <pc:spChg chg="add mod">
@@ -5116,7 +5300,7 @@
           <ac:spMkLst>
             <pc:docMk/>
             <pc:sldMk cId="43451586" sldId="256"/>
-            <ac:spMk id="765" creationId="{EBE83CCF-4885-72C9-6A97-96E948D951F8}"/>
+            <ac:spMk id="790" creationId="{D7F4B012-0B74-C11E-7270-C9B8ECCBCFC6}"/>
           </ac:spMkLst>
         </pc:spChg>
         <pc:spChg chg="add mod">
@@ -5124,7 +5308,7 @@
           <ac:spMkLst>
             <pc:docMk/>
             <pc:sldMk cId="43451586" sldId="256"/>
-            <ac:spMk id="766" creationId="{20B28656-5DB3-65BD-36F4-DBBA967920E5}"/>
+            <ac:spMk id="791" creationId="{5C26A753-3727-DC2B-BA3E-D763C511BCFB}"/>
           </ac:spMkLst>
         </pc:spChg>
         <pc:spChg chg="add mod">
@@ -5132,7 +5316,7 @@
           <ac:spMkLst>
             <pc:docMk/>
             <pc:sldMk cId="43451586" sldId="256"/>
-            <ac:spMk id="767" creationId="{D8641BE1-6CD9-7E4D-E2CD-2B1456EA844A}"/>
+            <ac:spMk id="792" creationId="{E3E51514-1538-439E-5571-DEEECA02B410}"/>
           </ac:spMkLst>
         </pc:spChg>
         <pc:spChg chg="add mod">
@@ -5140,7 +5324,7 @@
           <ac:spMkLst>
             <pc:docMk/>
             <pc:sldMk cId="43451586" sldId="256"/>
-            <ac:spMk id="768" creationId="{7610650F-D3E4-DFA1-716F-0621CD07F223}"/>
+            <ac:spMk id="793" creationId="{031BE832-D8F6-000A-2840-A8284532E766}"/>
           </ac:spMkLst>
         </pc:spChg>
         <pc:spChg chg="add mod">
@@ -5148,7 +5332,7 @@
           <ac:spMkLst>
             <pc:docMk/>
             <pc:sldMk cId="43451586" sldId="256"/>
-            <ac:spMk id="769" creationId="{0D6BD531-3A87-3742-5A40-070BC09FFDBF}"/>
+            <ac:spMk id="794" creationId="{D0821DE5-733F-B9B2-46F2-3B291C5289E1}"/>
           </ac:spMkLst>
         </pc:spChg>
         <pc:spChg chg="add mod">
@@ -5156,187 +5340,11 @@
           <ac:spMkLst>
             <pc:docMk/>
             <pc:sldMk cId="43451586" sldId="256"/>
-            <ac:spMk id="771" creationId="{39634027-628E-FD64-26AD-6B48398A0DBA}"/>
-          </ac:spMkLst>
-        </pc:spChg>
-        <pc:spChg chg="add mod">
-          <ac:chgData name="Fatima Pillosu" userId="a6295d4dc9e22643" providerId="LiveId" clId="{1D6CBF78-2251-4D85-B3DB-E7425FCA0324}" dt="2024-06-25T15:06:27.597" v="2072" actId="1035"/>
-          <ac:spMkLst>
-            <pc:docMk/>
-            <pc:sldMk cId="43451586" sldId="256"/>
-            <ac:spMk id="774" creationId="{4A0C66AA-527E-FBD3-4EA9-2D8C7A8439ED}"/>
-          </ac:spMkLst>
-        </pc:spChg>
-        <pc:spChg chg="add mod">
-          <ac:chgData name="Fatima Pillosu" userId="a6295d4dc9e22643" providerId="LiveId" clId="{1D6CBF78-2251-4D85-B3DB-E7425FCA0324}" dt="2024-06-25T15:06:27.597" v="2072" actId="1035"/>
-          <ac:spMkLst>
-            <pc:docMk/>
-            <pc:sldMk cId="43451586" sldId="256"/>
-            <ac:spMk id="775" creationId="{53786A25-BF5D-DD4A-11A4-24196734E502}"/>
-          </ac:spMkLst>
-        </pc:spChg>
-        <pc:spChg chg="add mod">
-          <ac:chgData name="Fatima Pillosu" userId="a6295d4dc9e22643" providerId="LiveId" clId="{1D6CBF78-2251-4D85-B3DB-E7425FCA0324}" dt="2024-06-25T15:06:27.597" v="2072" actId="1035"/>
-          <ac:spMkLst>
-            <pc:docMk/>
-            <pc:sldMk cId="43451586" sldId="256"/>
-            <ac:spMk id="776" creationId="{2A4BE103-7C09-BB50-9A93-95709158774D}"/>
-          </ac:spMkLst>
-        </pc:spChg>
-        <pc:spChg chg="add mod">
-          <ac:chgData name="Fatima Pillosu" userId="a6295d4dc9e22643" providerId="LiveId" clId="{1D6CBF78-2251-4D85-B3DB-E7425FCA0324}" dt="2024-06-25T15:06:27.597" v="2072" actId="1035"/>
-          <ac:spMkLst>
-            <pc:docMk/>
-            <pc:sldMk cId="43451586" sldId="256"/>
-            <ac:spMk id="777" creationId="{24BE8C28-F441-5648-C02C-0B394AAC9267}"/>
-          </ac:spMkLst>
-        </pc:spChg>
-        <pc:spChg chg="add mod">
-          <ac:chgData name="Fatima Pillosu" userId="a6295d4dc9e22643" providerId="LiveId" clId="{1D6CBF78-2251-4D85-B3DB-E7425FCA0324}" dt="2024-06-25T15:06:27.597" v="2072" actId="1035"/>
-          <ac:spMkLst>
-            <pc:docMk/>
-            <pc:sldMk cId="43451586" sldId="256"/>
-            <ac:spMk id="778" creationId="{CDD9B423-DBD5-45AC-045E-CD2DE2C251E9}"/>
-          </ac:spMkLst>
-        </pc:spChg>
-        <pc:spChg chg="add mod">
-          <ac:chgData name="Fatima Pillosu" userId="a6295d4dc9e22643" providerId="LiveId" clId="{1D6CBF78-2251-4D85-B3DB-E7425FCA0324}" dt="2024-06-25T15:06:27.597" v="2072" actId="1035"/>
-          <ac:spMkLst>
-            <pc:docMk/>
-            <pc:sldMk cId="43451586" sldId="256"/>
-            <ac:spMk id="779" creationId="{2BDFC988-6BEE-8F2B-314B-A7C9CC7AE102}"/>
-          </ac:spMkLst>
-        </pc:spChg>
-        <pc:spChg chg="add mod">
-          <ac:chgData name="Fatima Pillosu" userId="a6295d4dc9e22643" providerId="LiveId" clId="{1D6CBF78-2251-4D85-B3DB-E7425FCA0324}" dt="2024-06-25T15:06:27.597" v="2072" actId="1035"/>
-          <ac:spMkLst>
-            <pc:docMk/>
-            <pc:sldMk cId="43451586" sldId="256"/>
-            <ac:spMk id="780" creationId="{3F6A373D-1512-4A70-DD87-F376AB69B750}"/>
-          </ac:spMkLst>
-        </pc:spChg>
-        <pc:spChg chg="add mod">
-          <ac:chgData name="Fatima Pillosu" userId="a6295d4dc9e22643" providerId="LiveId" clId="{1D6CBF78-2251-4D85-B3DB-E7425FCA0324}" dt="2024-06-25T15:06:27.597" v="2072" actId="1035"/>
-          <ac:spMkLst>
-            <pc:docMk/>
-            <pc:sldMk cId="43451586" sldId="256"/>
-            <ac:spMk id="781" creationId="{E6C3F952-0914-4C3D-C859-53A44087F7EB}"/>
-          </ac:spMkLst>
-        </pc:spChg>
-        <pc:spChg chg="add mod">
-          <ac:chgData name="Fatima Pillosu" userId="a6295d4dc9e22643" providerId="LiveId" clId="{1D6CBF78-2251-4D85-B3DB-E7425FCA0324}" dt="2024-06-25T15:06:27.597" v="2072" actId="1035"/>
-          <ac:spMkLst>
-            <pc:docMk/>
-            <pc:sldMk cId="43451586" sldId="256"/>
-            <ac:spMk id="782" creationId="{C8AAC689-DD18-D864-5D53-7A644AF75EB7}"/>
-          </ac:spMkLst>
-        </pc:spChg>
-        <pc:spChg chg="add mod">
-          <ac:chgData name="Fatima Pillosu" userId="a6295d4dc9e22643" providerId="LiveId" clId="{1D6CBF78-2251-4D85-B3DB-E7425FCA0324}" dt="2024-06-25T15:06:27.597" v="2072" actId="1035"/>
-          <ac:spMkLst>
-            <pc:docMk/>
-            <pc:sldMk cId="43451586" sldId="256"/>
-            <ac:spMk id="783" creationId="{F1B9B417-B98D-CA70-0A56-420E7BB44407}"/>
-          </ac:spMkLst>
-        </pc:spChg>
-        <pc:spChg chg="add mod">
-          <ac:chgData name="Fatima Pillosu" userId="a6295d4dc9e22643" providerId="LiveId" clId="{1D6CBF78-2251-4D85-B3DB-E7425FCA0324}" dt="2024-06-25T15:06:27.597" v="2072" actId="1035"/>
-          <ac:spMkLst>
-            <pc:docMk/>
-            <pc:sldMk cId="43451586" sldId="256"/>
-            <ac:spMk id="784" creationId="{2CD2DA22-BA9E-6BEE-866F-E1237B2A0200}"/>
-          </ac:spMkLst>
-        </pc:spChg>
-        <pc:spChg chg="add mod">
-          <ac:chgData name="Fatima Pillosu" userId="a6295d4dc9e22643" providerId="LiveId" clId="{1D6CBF78-2251-4D85-B3DB-E7425FCA0324}" dt="2024-06-25T15:06:27.597" v="2072" actId="1035"/>
-          <ac:spMkLst>
-            <pc:docMk/>
-            <pc:sldMk cId="43451586" sldId="256"/>
-            <ac:spMk id="785" creationId="{6667EEC8-FBF3-7CDA-86FD-FF3037E44F4C}"/>
-          </ac:spMkLst>
-        </pc:spChg>
-        <pc:spChg chg="add mod">
-          <ac:chgData name="Fatima Pillosu" userId="a6295d4dc9e22643" providerId="LiveId" clId="{1D6CBF78-2251-4D85-B3DB-E7425FCA0324}" dt="2024-06-25T15:06:27.597" v="2072" actId="1035"/>
-          <ac:spMkLst>
-            <pc:docMk/>
-            <pc:sldMk cId="43451586" sldId="256"/>
-            <ac:spMk id="786" creationId="{D3109596-9E20-E94E-3C6A-9DB517257DA9}"/>
-          </ac:spMkLst>
-        </pc:spChg>
-        <pc:spChg chg="add mod">
-          <ac:chgData name="Fatima Pillosu" userId="a6295d4dc9e22643" providerId="LiveId" clId="{1D6CBF78-2251-4D85-B3DB-E7425FCA0324}" dt="2024-06-25T15:10:00.973" v="2149" actId="14100"/>
-          <ac:spMkLst>
-            <pc:docMk/>
-            <pc:sldMk cId="43451586" sldId="256"/>
-            <ac:spMk id="787" creationId="{0992449B-E2BD-5656-FCBA-66DA5579C5B4}"/>
-          </ac:spMkLst>
-        </pc:spChg>
-        <pc:spChg chg="add mod">
-          <ac:chgData name="Fatima Pillosu" userId="a6295d4dc9e22643" providerId="LiveId" clId="{1D6CBF78-2251-4D85-B3DB-E7425FCA0324}" dt="2024-06-25T15:06:27.597" v="2072" actId="1035"/>
-          <ac:spMkLst>
-            <pc:docMk/>
-            <pc:sldMk cId="43451586" sldId="256"/>
-            <ac:spMk id="788" creationId="{FBC7318D-1ADC-03C2-C0AA-599DF73A44A0}"/>
-          </ac:spMkLst>
-        </pc:spChg>
-        <pc:spChg chg="add mod">
-          <ac:chgData name="Fatima Pillosu" userId="a6295d4dc9e22643" providerId="LiveId" clId="{1D6CBF78-2251-4D85-B3DB-E7425FCA0324}" dt="2024-06-25T15:06:27.597" v="2072" actId="1035"/>
-          <ac:spMkLst>
-            <pc:docMk/>
-            <pc:sldMk cId="43451586" sldId="256"/>
-            <ac:spMk id="789" creationId="{5DAF83FA-08B8-C856-1B3B-B496269AADF0}"/>
-          </ac:spMkLst>
-        </pc:spChg>
-        <pc:spChg chg="add mod">
-          <ac:chgData name="Fatima Pillosu" userId="a6295d4dc9e22643" providerId="LiveId" clId="{1D6CBF78-2251-4D85-B3DB-E7425FCA0324}" dt="2024-06-25T15:06:27.597" v="2072" actId="1035"/>
-          <ac:spMkLst>
-            <pc:docMk/>
-            <pc:sldMk cId="43451586" sldId="256"/>
-            <ac:spMk id="790" creationId="{D7F4B012-0B74-C11E-7270-C9B8ECCBCFC6}"/>
-          </ac:spMkLst>
-        </pc:spChg>
-        <pc:spChg chg="add mod">
-          <ac:chgData name="Fatima Pillosu" userId="a6295d4dc9e22643" providerId="LiveId" clId="{1D6CBF78-2251-4D85-B3DB-E7425FCA0324}" dt="2024-06-25T15:06:27.597" v="2072" actId="1035"/>
-          <ac:spMkLst>
-            <pc:docMk/>
-            <pc:sldMk cId="43451586" sldId="256"/>
-            <ac:spMk id="791" creationId="{5C26A753-3727-DC2B-BA3E-D763C511BCFB}"/>
-          </ac:spMkLst>
-        </pc:spChg>
-        <pc:spChg chg="add mod">
-          <ac:chgData name="Fatima Pillosu" userId="a6295d4dc9e22643" providerId="LiveId" clId="{1D6CBF78-2251-4D85-B3DB-E7425FCA0324}" dt="2024-06-25T15:06:27.597" v="2072" actId="1035"/>
-          <ac:spMkLst>
-            <pc:docMk/>
-            <pc:sldMk cId="43451586" sldId="256"/>
-            <ac:spMk id="792" creationId="{E3E51514-1538-439E-5571-DEEECA02B410}"/>
-          </ac:spMkLst>
-        </pc:spChg>
-        <pc:spChg chg="add mod">
-          <ac:chgData name="Fatima Pillosu" userId="a6295d4dc9e22643" providerId="LiveId" clId="{1D6CBF78-2251-4D85-B3DB-E7425FCA0324}" dt="2024-06-25T15:06:27.597" v="2072" actId="1035"/>
-          <ac:spMkLst>
-            <pc:docMk/>
-            <pc:sldMk cId="43451586" sldId="256"/>
-            <ac:spMk id="793" creationId="{031BE832-D8F6-000A-2840-A8284532E766}"/>
-          </ac:spMkLst>
-        </pc:spChg>
-        <pc:spChg chg="add mod">
-          <ac:chgData name="Fatima Pillosu" userId="a6295d4dc9e22643" providerId="LiveId" clId="{1D6CBF78-2251-4D85-B3DB-E7425FCA0324}" dt="2024-06-25T15:06:27.597" v="2072" actId="1035"/>
-          <ac:spMkLst>
-            <pc:docMk/>
-            <pc:sldMk cId="43451586" sldId="256"/>
-            <ac:spMk id="794" creationId="{D0821DE5-733F-B9B2-46F2-3B291C5289E1}"/>
-          </ac:spMkLst>
-        </pc:spChg>
-        <pc:spChg chg="add mod">
-          <ac:chgData name="Fatima Pillosu" userId="a6295d4dc9e22643" providerId="LiveId" clId="{1D6CBF78-2251-4D85-B3DB-E7425FCA0324}" dt="2024-06-25T15:06:27.597" v="2072" actId="1035"/>
-          <ac:spMkLst>
-            <pc:docMk/>
-            <pc:sldMk cId="43451586" sldId="256"/>
             <ac:spMk id="795" creationId="{2AFA75F4-9320-83AC-F418-AE771A4C791F}"/>
           </ac:spMkLst>
         </pc:spChg>
         <pc:spChg chg="add mod">
-          <ac:chgData name="Fatima Pillosu" userId="a6295d4dc9e22643" providerId="LiveId" clId="{1D6CBF78-2251-4D85-B3DB-E7425FCA0324}" dt="2024-06-25T15:06:27.597" v="2072" actId="1035"/>
+          <ac:chgData name="Fatima Pillosu" userId="a6295d4dc9e22643" providerId="LiveId" clId="{1D6CBF78-2251-4D85-B3DB-E7425FCA0324}" dt="2024-06-29T23:08:50.778" v="2177" actId="1076"/>
           <ac:spMkLst>
             <pc:docMk/>
             <pc:sldMk cId="43451586" sldId="256"/>
@@ -5463,6 +5471,14 @@
             <ac:grpSpMk id="798" creationId="{A0618D8A-7DD9-D8EE-92C1-11FF3BD941D5}"/>
           </ac:grpSpMkLst>
         </pc:grpChg>
+        <pc:picChg chg="add del mod ord modCrop">
+          <ac:chgData name="Fatima Pillosu" userId="a6295d4dc9e22643" providerId="LiveId" clId="{1D6CBF78-2251-4D85-B3DB-E7425FCA0324}" dt="2024-06-29T23:30:33.920" v="2287" actId="478"/>
+          <ac:picMkLst>
+            <pc:docMk/>
+            <pc:sldMk cId="43451586" sldId="256"/>
+            <ac:picMk id="3" creationId="{80B2AEEE-8EAC-CDF3-49E9-3972D0BC36D9}"/>
+          </ac:picMkLst>
+        </pc:picChg>
         <pc:picChg chg="add del mod">
           <ac:chgData name="Fatima Pillosu" userId="a6295d4dc9e22643" providerId="LiveId" clId="{1D6CBF78-2251-4D85-B3DB-E7425FCA0324}" dt="2024-06-25T11:16:09.244" v="161" actId="21"/>
           <ac:picMkLst>
@@ -5487,6 +5503,22 @@
             <ac:picMk id="15" creationId="{E12B2AAC-7CBA-914A-D973-10C8400C8457}"/>
           </ac:picMkLst>
         </pc:picChg>
+        <pc:picChg chg="add del mod ord modCrop">
+          <ac:chgData name="Fatima Pillosu" userId="a6295d4dc9e22643" providerId="LiveId" clId="{1D6CBF78-2251-4D85-B3DB-E7425FCA0324}" dt="2024-06-29T23:21:52.435" v="2263" actId="167"/>
+          <ac:picMkLst>
+            <pc:docMk/>
+            <pc:sldMk cId="43451586" sldId="256"/>
+            <ac:picMk id="25" creationId="{B9A4A0B2-7CE8-807A-7D42-59FD74AC158E}"/>
+          </ac:picMkLst>
+        </pc:picChg>
+        <pc:picChg chg="add mod modCrop">
+          <ac:chgData name="Fatima Pillosu" userId="a6295d4dc9e22643" providerId="LiveId" clId="{1D6CBF78-2251-4D85-B3DB-E7425FCA0324}" dt="2024-06-29T23:31:30.069" v="2300" actId="1076"/>
+          <ac:picMkLst>
+            <pc:docMk/>
+            <pc:sldMk cId="43451586" sldId="256"/>
+            <ac:picMk id="27" creationId="{95B25774-144F-ED37-0F77-4BD1F3D23CF5}"/>
+          </ac:picMkLst>
+        </pc:picChg>
         <pc:picChg chg="add del mod">
           <ac:chgData name="Fatima Pillosu" userId="a6295d4dc9e22643" providerId="LiveId" clId="{1D6CBF78-2251-4D85-B3DB-E7425FCA0324}" dt="2024-06-25T11:16:09.244" v="161" actId="21"/>
           <ac:picMkLst>
@@ -5719,8 +5751,8 @@
             <ac:picMk id="689" creationId="{F62342E9-CC25-8393-C713-DA59C3D90811}"/>
           </ac:picMkLst>
         </pc:picChg>
-        <pc:picChg chg="add mod">
-          <ac:chgData name="Fatima Pillosu" userId="a6295d4dc9e22643" providerId="LiveId" clId="{1D6CBF78-2251-4D85-B3DB-E7425FCA0324}" dt="2024-06-25T15:06:27.597" v="2072" actId="1035"/>
+        <pc:picChg chg="add del mod">
+          <ac:chgData name="Fatima Pillosu" userId="a6295d4dc9e22643" providerId="LiveId" clId="{1D6CBF78-2251-4D85-B3DB-E7425FCA0324}" dt="2024-06-29T23:21:56.688" v="2264" actId="478"/>
           <ac:picMkLst>
             <pc:docMk/>
             <pc:sldMk cId="43451586" sldId="256"/>
@@ -5751,6 +5783,22 @@
             <ac:picMk id="799" creationId="{57CEB5DD-105C-1520-0B60-0C5B46232D16}"/>
           </ac:picMkLst>
         </pc:picChg>
+        <pc:cxnChg chg="add mod">
+          <ac:chgData name="Fatima Pillosu" userId="a6295d4dc9e22643" providerId="LiveId" clId="{1D6CBF78-2251-4D85-B3DB-E7425FCA0324}" dt="2024-06-29T23:31:54.271" v="2304" actId="14100"/>
+          <ac:cxnSpMkLst>
+            <pc:docMk/>
+            <pc:sldMk cId="43451586" sldId="256"/>
+            <ac:cxnSpMk id="6" creationId="{C9FEFF1C-BA4E-8DE0-D135-1B87734177E8}"/>
+          </ac:cxnSpMkLst>
+        </pc:cxnChg>
+        <pc:cxnChg chg="add mod ord">
+          <ac:chgData name="Fatima Pillosu" userId="a6295d4dc9e22643" providerId="LiveId" clId="{1D6CBF78-2251-4D85-B3DB-E7425FCA0324}" dt="2024-06-29T23:31:43.743" v="2302" actId="14100"/>
+          <ac:cxnSpMkLst>
+            <pc:docMk/>
+            <pc:sldMk cId="43451586" sldId="256"/>
+            <ac:cxnSpMk id="7" creationId="{5E06CAD1-ACBF-2EB4-126A-7FB8DE3FAD1F}"/>
+          </ac:cxnSpMkLst>
+        </pc:cxnChg>
         <pc:cxnChg chg="add del mod">
           <ac:chgData name="Fatima Pillosu" userId="a6295d4dc9e22643" providerId="LiveId" clId="{1D6CBF78-2251-4D85-B3DB-E7425FCA0324}" dt="2024-06-25T11:16:09.244" v="161" actId="21"/>
           <ac:cxnSpMkLst>
@@ -8314,7 +8362,7 @@
           <a:p>
             <a:fld id="{26592153-C028-4DFF-87EE-E61A3F376311}" type="datetimeFigureOut">
               <a:rPr lang="en-GB" smtClean="0"/>
-              <a:t>25/06/2024</a:t>
+              <a:t>30/06/2024</a:t>
             </a:fld>
             <a:endParaRPr lang="en-GB"/>
           </a:p>
@@ -8484,7 +8532,7 @@
           <a:p>
             <a:fld id="{26592153-C028-4DFF-87EE-E61A3F376311}" type="datetimeFigureOut">
               <a:rPr lang="en-GB" smtClean="0"/>
-              <a:t>25/06/2024</a:t>
+              <a:t>30/06/2024</a:t>
             </a:fld>
             <a:endParaRPr lang="en-GB"/>
           </a:p>
@@ -8664,7 +8712,7 @@
           <a:p>
             <a:fld id="{26592153-C028-4DFF-87EE-E61A3F376311}" type="datetimeFigureOut">
               <a:rPr lang="en-GB" smtClean="0"/>
-              <a:t>25/06/2024</a:t>
+              <a:t>30/06/2024</a:t>
             </a:fld>
             <a:endParaRPr lang="en-GB"/>
           </a:p>
@@ -8834,7 +8882,7 @@
           <a:p>
             <a:fld id="{26592153-C028-4DFF-87EE-E61A3F376311}" type="datetimeFigureOut">
               <a:rPr lang="en-GB" smtClean="0"/>
-              <a:t>25/06/2024</a:t>
+              <a:t>30/06/2024</a:t>
             </a:fld>
             <a:endParaRPr lang="en-GB"/>
           </a:p>
@@ -9078,7 +9126,7 @@
           <a:p>
             <a:fld id="{26592153-C028-4DFF-87EE-E61A3F376311}" type="datetimeFigureOut">
               <a:rPr lang="en-GB" smtClean="0"/>
-              <a:t>25/06/2024</a:t>
+              <a:t>30/06/2024</a:t>
             </a:fld>
             <a:endParaRPr lang="en-GB"/>
           </a:p>
@@ -9310,7 +9358,7 @@
           <a:p>
             <a:fld id="{26592153-C028-4DFF-87EE-E61A3F376311}" type="datetimeFigureOut">
               <a:rPr lang="en-GB" smtClean="0"/>
-              <a:t>25/06/2024</a:t>
+              <a:t>30/06/2024</a:t>
             </a:fld>
             <a:endParaRPr lang="en-GB"/>
           </a:p>
@@ -9677,7 +9725,7 @@
           <a:p>
             <a:fld id="{26592153-C028-4DFF-87EE-E61A3F376311}" type="datetimeFigureOut">
               <a:rPr lang="en-GB" smtClean="0"/>
-              <a:t>25/06/2024</a:t>
+              <a:t>30/06/2024</a:t>
             </a:fld>
             <a:endParaRPr lang="en-GB"/>
           </a:p>
@@ -9795,7 +9843,7 @@
           <a:p>
             <a:fld id="{26592153-C028-4DFF-87EE-E61A3F376311}" type="datetimeFigureOut">
               <a:rPr lang="en-GB" smtClean="0"/>
-              <a:t>25/06/2024</a:t>
+              <a:t>30/06/2024</a:t>
             </a:fld>
             <a:endParaRPr lang="en-GB"/>
           </a:p>
@@ -9890,7 +9938,7 @@
           <a:p>
             <a:fld id="{26592153-C028-4DFF-87EE-E61A3F376311}" type="datetimeFigureOut">
               <a:rPr lang="en-GB" smtClean="0"/>
-              <a:t>25/06/2024</a:t>
+              <a:t>30/06/2024</a:t>
             </a:fld>
             <a:endParaRPr lang="en-GB"/>
           </a:p>
@@ -10167,7 +10215,7 @@
           <a:p>
             <a:fld id="{26592153-C028-4DFF-87EE-E61A3F376311}" type="datetimeFigureOut">
               <a:rPr lang="en-GB" smtClean="0"/>
-              <a:t>25/06/2024</a:t>
+              <a:t>30/06/2024</a:t>
             </a:fld>
             <a:endParaRPr lang="en-GB"/>
           </a:p>
@@ -10424,7 +10472,7 @@
           <a:p>
             <a:fld id="{26592153-C028-4DFF-87EE-E61A3F376311}" type="datetimeFigureOut">
               <a:rPr lang="en-GB" smtClean="0"/>
-              <a:t>25/06/2024</a:t>
+              <a:t>30/06/2024</a:t>
             </a:fld>
             <a:endParaRPr lang="en-GB"/>
           </a:p>
@@ -10637,7 +10685,7 @@
           <a:p>
             <a:fld id="{26592153-C028-4DFF-87EE-E61A3F376311}" type="datetimeFigureOut">
               <a:rPr lang="en-GB" smtClean="0"/>
-              <a:t>25/06/2024</a:t>
+              <a:t>30/06/2024</a:t>
             </a:fld>
             <a:endParaRPr lang="en-GB"/>
           </a:p>
@@ -11044,6 +11092,41 @@
       </p:grpSpPr>
       <p:pic>
         <p:nvPicPr>
+          <p:cNvPr id="25" name="Picture 24" descr="A graph of a graph&#10;&#10;Description automatically generated with medium confidence">
+            <a:extLst>
+              <a:ext uri="{FF2B5EF4-FFF2-40B4-BE49-F238E27FC236}">
+                <a16:creationId xmlns:a16="http://schemas.microsoft.com/office/drawing/2014/main" id="{B9A4A0B2-7CE8-807A-7D42-59FD74AC158E}"/>
+              </a:ext>
+            </a:extLst>
+          </p:cNvPr>
+          <p:cNvPicPr>
+            <a:picLocks noChangeAspect="1"/>
+          </p:cNvPicPr>
+          <p:nvPr/>
+        </p:nvPicPr>
+        <p:blipFill rotWithShape="1">
+          <a:blip r:embed="rId2">
+            <a:extLst>
+              <a:ext uri="{28A0092B-C50C-407E-A947-70E740481C1C}">
+                <a14:useLocalDpi xmlns:a14="http://schemas.microsoft.com/office/drawing/2010/main" val="0"/>
+              </a:ext>
+            </a:extLst>
+          </a:blip>
+          <a:srcRect l="4386" t="5754" r="345" b="14944"/>
+          <a:stretch/>
+        </p:blipFill>
+        <p:spPr>
+          <a:xfrm>
+            <a:off x="2802686" y="455200"/>
+            <a:ext cx="3978974" cy="1386073"/>
+          </a:xfrm>
+          <a:prstGeom prst="rect">
+            <a:avLst/>
+          </a:prstGeom>
+        </p:spPr>
+      </p:pic>
+      <p:pic>
+        <p:nvPicPr>
           <p:cNvPr id="688" name="Picture 687" descr="A graph showing the number of flood reports&#10;&#10;Description automatically generated">
             <a:extLst>
               <a:ext uri="{FF2B5EF4-FFF2-40B4-BE49-F238E27FC236}">
@@ -11057,7 +11140,7 @@
           <p:nvPr/>
         </p:nvPicPr>
         <p:blipFill rotWithShape="1">
-          <a:blip r:embed="rId2">
+          <a:blip r:embed="rId3">
             <a:extLst>
               <a:ext uri="{28A0092B-C50C-407E-A947-70E740481C1C}">
                 <a14:useLocalDpi xmlns:a14="http://schemas.microsoft.com/office/drawing/2010/main" val="0"/>
@@ -11092,7 +11175,7 @@
           <p:nvPr/>
         </p:nvPicPr>
         <p:blipFill rotWithShape="1">
-          <a:blip r:embed="rId3">
+          <a:blip r:embed="rId4">
             <a:extLst>
               <a:ext uri="{28A0092B-C50C-407E-A947-70E740481C1C}">
                 <a14:useLocalDpi xmlns:a14="http://schemas.microsoft.com/office/drawing/2010/main" val="0"/>
@@ -11491,41 +11574,6 @@
           </a:p>
         </p:txBody>
       </p:sp>
-      <p:pic>
-        <p:nvPicPr>
-          <p:cNvPr id="696" name="Picture 695" descr="A graph showing a number of points&#10;&#10;Description automatically generated with medium confidence">
-            <a:extLst>
-              <a:ext uri="{FF2B5EF4-FFF2-40B4-BE49-F238E27FC236}">
-                <a16:creationId xmlns:a16="http://schemas.microsoft.com/office/drawing/2014/main" id="{E12B2AAC-7CBA-914A-D973-10C8400C8457}"/>
-              </a:ext>
-            </a:extLst>
-          </p:cNvPr>
-          <p:cNvPicPr>
-            <a:picLocks noChangeAspect="1"/>
-          </p:cNvPicPr>
-          <p:nvPr/>
-        </p:nvPicPr>
-        <p:blipFill rotWithShape="1">
-          <a:blip r:embed="rId4">
-            <a:extLst>
-              <a:ext uri="{28A0092B-C50C-407E-A947-70E740481C1C}">
-                <a14:useLocalDpi xmlns:a14="http://schemas.microsoft.com/office/drawing/2010/main" val="0"/>
-              </a:ext>
-            </a:extLst>
-          </a:blip>
-          <a:srcRect l="4220" t="5399" b="14917"/>
-          <a:stretch/>
-        </p:blipFill>
-        <p:spPr>
-          <a:xfrm>
-            <a:off x="2795843" y="448062"/>
-            <a:ext cx="4003329" cy="1393211"/>
-          </a:xfrm>
-          <a:prstGeom prst="rect">
-            <a:avLst/>
-          </a:prstGeom>
-        </p:spPr>
-      </p:pic>
       <p:sp>
         <p:nvSpPr>
           <p:cNvPr id="697" name="TextBox 696">
@@ -11540,7 +11588,7 @@
         </p:nvSpPr>
         <p:spPr>
           <a:xfrm>
-            <a:off x="2316884" y="538084"/>
+            <a:off x="2332594" y="538084"/>
             <a:ext cx="536815" cy="215444"/>
           </a:xfrm>
           <a:prstGeom prst="rect">
@@ -11589,7 +11637,7 @@
         </p:nvSpPr>
         <p:spPr>
           <a:xfrm>
-            <a:off x="2316884" y="772832"/>
+            <a:off x="2332594" y="772832"/>
             <a:ext cx="536815" cy="215444"/>
           </a:xfrm>
           <a:prstGeom prst="rect">
@@ -11638,7 +11686,7 @@
         </p:nvSpPr>
         <p:spPr>
           <a:xfrm>
-            <a:off x="2316884" y="1007580"/>
+            <a:off x="2332594" y="1007580"/>
             <a:ext cx="536815" cy="215444"/>
           </a:xfrm>
           <a:prstGeom prst="rect">
@@ -11687,7 +11735,7 @@
         </p:nvSpPr>
         <p:spPr>
           <a:xfrm>
-            <a:off x="2316884" y="1242328"/>
+            <a:off x="2332594" y="1242328"/>
             <a:ext cx="536815" cy="215444"/>
           </a:xfrm>
           <a:prstGeom prst="rect">
@@ -11736,7 +11784,7 @@
         </p:nvSpPr>
         <p:spPr>
           <a:xfrm>
-            <a:off x="2316884" y="1477076"/>
+            <a:off x="2332594" y="1477076"/>
             <a:ext cx="536815" cy="215444"/>
           </a:xfrm>
           <a:prstGeom prst="rect">
@@ -11785,7 +11833,7 @@
         </p:nvSpPr>
         <p:spPr>
           <a:xfrm>
-            <a:off x="2238605" y="1711823"/>
+            <a:off x="2254315" y="1711823"/>
             <a:ext cx="615094" cy="215444"/>
           </a:xfrm>
           <a:prstGeom prst="rect">
@@ -11834,8 +11882,8 @@
         </p:nvSpPr>
         <p:spPr>
           <a:xfrm rot="19800000">
-            <a:off x="2668340" y="1831977"/>
-            <a:ext cx="615094" cy="215444"/>
+            <a:off x="2673611" y="1851443"/>
+            <a:ext cx="536400" cy="215444"/>
           </a:xfrm>
           <a:prstGeom prst="rect">
             <a:avLst/>
@@ -12478,7 +12526,7 @@
             <a:avLst/>
           </a:prstGeom>
           <a:solidFill>
-            <a:schemeClr val="tx1"/>
+            <a:srgbClr val="FF0000"/>
           </a:solidFill>
           <a:ln>
             <a:noFill/>
@@ -12530,7 +12578,7 @@
             <a:avLst/>
           </a:prstGeom>
           <a:solidFill>
-            <a:srgbClr val="FF0000"/>
+            <a:schemeClr val="tx1"/>
           </a:solidFill>
           <a:ln>
             <a:noFill/>
@@ -13878,7 +13926,7 @@
           <p:nvPr/>
         </p:nvPicPr>
         <p:blipFill rotWithShape="1">
-          <a:blip r:embed="rId3">
+          <a:blip r:embed="rId4">
             <a:extLst>
               <a:ext uri="{28A0092B-C50C-407E-A947-70E740481C1C}">
                 <a14:useLocalDpi xmlns:a14="http://schemas.microsoft.com/office/drawing/2010/main" val="0"/>
@@ -16404,7 +16452,7 @@
         </p:nvSpPr>
         <p:spPr>
           <a:xfrm>
-            <a:off x="6454249" y="3576740"/>
+            <a:off x="6569546" y="3576298"/>
             <a:ext cx="224268" cy="215444"/>
           </a:xfrm>
           <a:prstGeom prst="rect">
@@ -16935,6 +16983,188 @@
           </p:txBody>
         </p:sp>
       </p:grpSp>
+      <p:sp>
+        <p:nvSpPr>
+          <p:cNvPr id="4" name="Oval 3">
+            <a:extLst>
+              <a:ext uri="{FF2B5EF4-FFF2-40B4-BE49-F238E27FC236}">
+                <a16:creationId xmlns:a16="http://schemas.microsoft.com/office/drawing/2014/main" id="{40D2BF79-CA13-92D1-FF7D-487B73D96841}"/>
+              </a:ext>
+            </a:extLst>
+          </p:cNvPr>
+          <p:cNvSpPr/>
+          <p:nvPr/>
+        </p:nvSpPr>
+        <p:spPr>
+          <a:xfrm>
+            <a:off x="6010259" y="3269497"/>
+            <a:ext cx="383284" cy="371219"/>
+          </a:xfrm>
+          <a:prstGeom prst="ellipse">
+            <a:avLst/>
+          </a:prstGeom>
+          <a:noFill/>
+          <a:ln w="3175">
+            <a:solidFill>
+              <a:schemeClr val="bg2">
+                <a:lumMod val="50000"/>
+              </a:schemeClr>
+            </a:solidFill>
+          </a:ln>
+        </p:spPr>
+        <p:style>
+          <a:lnRef idx="2">
+            <a:schemeClr val="accent1">
+              <a:shade val="15000"/>
+            </a:schemeClr>
+          </a:lnRef>
+          <a:fillRef idx="1">
+            <a:schemeClr val="accent1"/>
+          </a:fillRef>
+          <a:effectRef idx="0">
+            <a:schemeClr val="accent1"/>
+          </a:effectRef>
+          <a:fontRef idx="minor">
+            <a:schemeClr val="lt1"/>
+          </a:fontRef>
+        </p:style>
+        <p:txBody>
+          <a:bodyPr rtlCol="0" anchor="ctr"/>
+          <a:lstStyle/>
+          <a:p>
+            <a:pPr algn="ctr"/>
+            <a:endParaRPr lang="en-GB"/>
+          </a:p>
+        </p:txBody>
+      </p:sp>
+      <p:cxnSp>
+        <p:nvCxnSpPr>
+          <p:cNvPr id="6" name="Straight Connector 5">
+            <a:extLst>
+              <a:ext uri="{FF2B5EF4-FFF2-40B4-BE49-F238E27FC236}">
+                <a16:creationId xmlns:a16="http://schemas.microsoft.com/office/drawing/2014/main" id="{C9FEFF1C-BA4E-8DE0-D135-1B87734177E8}"/>
+              </a:ext>
+            </a:extLst>
+          </p:cNvPr>
+          <p:cNvCxnSpPr>
+            <a:cxnSpLocks/>
+            <a:stCxn id="4" idx="1"/>
+          </p:cNvCxnSpPr>
+          <p:nvPr/>
+        </p:nvCxnSpPr>
+        <p:spPr>
+          <a:xfrm flipH="1">
+            <a:off x="4866468" y="3323861"/>
+            <a:ext cx="1199922" cy="1172047"/>
+          </a:xfrm>
+          <a:prstGeom prst="line">
+            <a:avLst/>
+          </a:prstGeom>
+          <a:ln w="3175">
+            <a:solidFill>
+              <a:schemeClr val="bg2">
+                <a:lumMod val="50000"/>
+              </a:schemeClr>
+            </a:solidFill>
+          </a:ln>
+        </p:spPr>
+        <p:style>
+          <a:lnRef idx="1">
+            <a:schemeClr val="accent1"/>
+          </a:lnRef>
+          <a:fillRef idx="0">
+            <a:schemeClr val="accent1"/>
+          </a:fillRef>
+          <a:effectRef idx="0">
+            <a:schemeClr val="accent1"/>
+          </a:effectRef>
+          <a:fontRef idx="minor">
+            <a:schemeClr val="tx1"/>
+          </a:fontRef>
+        </p:style>
+      </p:cxnSp>
+      <p:cxnSp>
+        <p:nvCxnSpPr>
+          <p:cNvPr id="7" name="Straight Connector 6">
+            <a:extLst>
+              <a:ext uri="{FF2B5EF4-FFF2-40B4-BE49-F238E27FC236}">
+                <a16:creationId xmlns:a16="http://schemas.microsoft.com/office/drawing/2014/main" id="{5E06CAD1-ACBF-2EB4-126A-7FB8DE3FAD1F}"/>
+              </a:ext>
+            </a:extLst>
+          </p:cNvPr>
+          <p:cNvCxnSpPr>
+            <a:cxnSpLocks/>
+            <a:stCxn id="4" idx="6"/>
+          </p:cNvCxnSpPr>
+          <p:nvPr/>
+        </p:nvCxnSpPr>
+        <p:spPr>
+          <a:xfrm>
+            <a:off x="6393543" y="3455107"/>
+            <a:ext cx="283595" cy="1040801"/>
+          </a:xfrm>
+          <a:prstGeom prst="line">
+            <a:avLst/>
+          </a:prstGeom>
+          <a:ln w="3175">
+            <a:solidFill>
+              <a:schemeClr val="bg2">
+                <a:lumMod val="50000"/>
+              </a:schemeClr>
+            </a:solidFill>
+          </a:ln>
+        </p:spPr>
+        <p:style>
+          <a:lnRef idx="1">
+            <a:schemeClr val="accent1"/>
+          </a:lnRef>
+          <a:fillRef idx="0">
+            <a:schemeClr val="accent1"/>
+          </a:fillRef>
+          <a:effectRef idx="0">
+            <a:schemeClr val="accent1"/>
+          </a:effectRef>
+          <a:fontRef idx="minor">
+            <a:schemeClr val="tx1"/>
+          </a:fontRef>
+        </p:style>
+      </p:cxnSp>
+      <p:pic>
+        <p:nvPicPr>
+          <p:cNvPr id="27" name="Picture 26">
+            <a:extLst>
+              <a:ext uri="{FF2B5EF4-FFF2-40B4-BE49-F238E27FC236}">
+                <a16:creationId xmlns:a16="http://schemas.microsoft.com/office/drawing/2014/main" id="{95B25774-144F-ED37-0F77-4BD1F3D23CF5}"/>
+              </a:ext>
+            </a:extLst>
+          </p:cNvPr>
+          <p:cNvPicPr>
+            <a:picLocks noChangeAspect="1"/>
+          </p:cNvPicPr>
+          <p:nvPr/>
+        </p:nvPicPr>
+        <p:blipFill rotWithShape="1">
+          <a:blip r:embed="rId7"/>
+          <a:srcRect l="2022" t="5960" r="6772" b="7663"/>
+          <a:stretch/>
+        </p:blipFill>
+        <p:spPr>
+          <a:xfrm>
+            <a:off x="4875199" y="4495908"/>
+            <a:ext cx="1801939" cy="1167474"/>
+          </a:xfrm>
+          <a:prstGeom prst="rect">
+            <a:avLst/>
+          </a:prstGeom>
+          <a:ln w="3175">
+            <a:solidFill>
+              <a:schemeClr val="bg2">
+                <a:lumMod val="50000"/>
+              </a:schemeClr>
+            </a:solidFill>
+          </a:ln>
+        </p:spPr>
+      </p:pic>
     </p:spTree>
     <p:extLst>
       <p:ext uri="{BB962C8B-B14F-4D97-AF65-F5344CB8AC3E}">

</xml_diff>